<commit_message>
update floating road addresses fixing to viite manual
</commit_message>
<xml_diff>
--- a/viite-UI/manual/Presentation13.pptx
+++ b/viite-UI/manual/Presentation13.pptx
@@ -241,7 +241,7 @@
           <a:p>
             <a:fld id="{D3B6C589-7313-4E4B-8515-13C1DBFD88ED}" type="datetimeFigureOut">
               <a:rPr lang="en-US" smtClean="0"/>
-              <a:t>5/8/2017</a:t>
+              <a:t>5/9/2017</a:t>
             </a:fld>
             <a:endParaRPr lang="en-US"/>
           </a:p>
@@ -409,7 +409,7 @@
           <a:p>
             <a:fld id="{D3B6C589-7313-4E4B-8515-13C1DBFD88ED}" type="datetimeFigureOut">
               <a:rPr lang="en-US" smtClean="0"/>
-              <a:t>5/8/2017</a:t>
+              <a:t>5/9/2017</a:t>
             </a:fld>
             <a:endParaRPr lang="en-US"/>
           </a:p>
@@ -587,7 +587,7 @@
           <a:p>
             <a:fld id="{D3B6C589-7313-4E4B-8515-13C1DBFD88ED}" type="datetimeFigureOut">
               <a:rPr lang="en-US" smtClean="0"/>
-              <a:t>5/8/2017</a:t>
+              <a:t>5/9/2017</a:t>
             </a:fld>
             <a:endParaRPr lang="en-US"/>
           </a:p>
@@ -755,7 +755,7 @@
           <a:p>
             <a:fld id="{D3B6C589-7313-4E4B-8515-13C1DBFD88ED}" type="datetimeFigureOut">
               <a:rPr lang="en-US" smtClean="0"/>
-              <a:t>5/8/2017</a:t>
+              <a:t>5/9/2017</a:t>
             </a:fld>
             <a:endParaRPr lang="en-US"/>
           </a:p>
@@ -1000,7 +1000,7 @@
           <a:p>
             <a:fld id="{D3B6C589-7313-4E4B-8515-13C1DBFD88ED}" type="datetimeFigureOut">
               <a:rPr lang="en-US" smtClean="0"/>
-              <a:t>5/8/2017</a:t>
+              <a:t>5/9/2017</a:t>
             </a:fld>
             <a:endParaRPr lang="en-US"/>
           </a:p>
@@ -1229,7 +1229,7 @@
           <a:p>
             <a:fld id="{D3B6C589-7313-4E4B-8515-13C1DBFD88ED}" type="datetimeFigureOut">
               <a:rPr lang="en-US" smtClean="0"/>
-              <a:t>5/8/2017</a:t>
+              <a:t>5/9/2017</a:t>
             </a:fld>
             <a:endParaRPr lang="en-US"/>
           </a:p>
@@ -1593,7 +1593,7 @@
           <a:p>
             <a:fld id="{D3B6C589-7313-4E4B-8515-13C1DBFD88ED}" type="datetimeFigureOut">
               <a:rPr lang="en-US" smtClean="0"/>
-              <a:t>5/8/2017</a:t>
+              <a:t>5/9/2017</a:t>
             </a:fld>
             <a:endParaRPr lang="en-US"/>
           </a:p>
@@ -1710,7 +1710,7 @@
           <a:p>
             <a:fld id="{D3B6C589-7313-4E4B-8515-13C1DBFD88ED}" type="datetimeFigureOut">
               <a:rPr lang="en-US" smtClean="0"/>
-              <a:t>5/8/2017</a:t>
+              <a:t>5/9/2017</a:t>
             </a:fld>
             <a:endParaRPr lang="en-US"/>
           </a:p>
@@ -1805,7 +1805,7 @@
           <a:p>
             <a:fld id="{D3B6C589-7313-4E4B-8515-13C1DBFD88ED}" type="datetimeFigureOut">
               <a:rPr lang="en-US" smtClean="0"/>
-              <a:t>5/8/2017</a:t>
+              <a:t>5/9/2017</a:t>
             </a:fld>
             <a:endParaRPr lang="en-US"/>
           </a:p>
@@ -2080,7 +2080,7 @@
           <a:p>
             <a:fld id="{D3B6C589-7313-4E4B-8515-13C1DBFD88ED}" type="datetimeFigureOut">
               <a:rPr lang="en-US" smtClean="0"/>
-              <a:t>5/8/2017</a:t>
+              <a:t>5/9/2017</a:t>
             </a:fld>
             <a:endParaRPr lang="en-US"/>
           </a:p>
@@ -2332,7 +2332,7 @@
           <a:p>
             <a:fld id="{D3B6C589-7313-4E4B-8515-13C1DBFD88ED}" type="datetimeFigureOut">
               <a:rPr lang="en-US" smtClean="0"/>
-              <a:t>5/8/2017</a:t>
+              <a:t>5/9/2017</a:t>
             </a:fld>
             <a:endParaRPr lang="en-US"/>
           </a:p>
@@ -2543,7 +2543,7 @@
           <a:p>
             <a:fld id="{D3B6C589-7313-4E4B-8515-13C1DBFD88ED}" type="datetimeFigureOut">
               <a:rPr lang="en-US" smtClean="0"/>
-              <a:t>5/8/2017</a:t>
+              <a:t>5/9/2017</a:t>
             </a:fld>
             <a:endParaRPr lang="en-US"/>
           </a:p>
@@ -2950,28 +2950,22 @@
       </p:grpSpPr>
       <p:pic>
         <p:nvPicPr>
-          <p:cNvPr id="7" name="Picture 6"/>
+          <p:cNvPr id="16" name="Picture 15"/>
           <p:cNvPicPr>
             <a:picLocks noChangeAspect="1"/>
           </p:cNvPicPr>
           <p:nvPr/>
         </p:nvPicPr>
         <p:blipFill>
-          <a:blip r:embed="rId2">
-            <a:extLst>
-              <a:ext uri="{28A0092B-C50C-407E-A947-70E740481C1C}">
-                <a14:useLocalDpi xmlns:a14="http://schemas.microsoft.com/office/drawing/2010/main" val="0"/>
-              </a:ext>
-            </a:extLst>
-          </a:blip>
+          <a:blip r:embed="rId2"/>
           <a:stretch>
             <a:fillRect/>
           </a:stretch>
         </p:blipFill>
         <p:spPr>
           <a:xfrm>
-            <a:off x="0" y="0"/>
-            <a:ext cx="11732890" cy="6858000"/>
+            <a:off x="0" y="-20052"/>
+            <a:ext cx="11697142" cy="6858000"/>
           </a:xfrm>
           <a:prstGeom prst="rect">
             <a:avLst/>
@@ -2980,13 +2974,13 @@
       </p:pic>
       <p:sp>
         <p:nvSpPr>
-          <p:cNvPr id="4" name="Oval 3"/>
+          <p:cNvPr id="17" name="Oval 16"/>
           <p:cNvSpPr/>
           <p:nvPr/>
         </p:nvSpPr>
         <p:spPr>
           <a:xfrm>
-            <a:off x="11347497" y="3100137"/>
+            <a:off x="11160150" y="2915653"/>
             <a:ext cx="320842" cy="328863"/>
           </a:xfrm>
           <a:prstGeom prst="ellipse">
@@ -3026,7 +3020,123 @@
                   <a:srgbClr val="FF0000"/>
                 </a:solidFill>
               </a:rPr>
-              <a:t>5</a:t>
+              <a:t>1</a:t>
+            </a:r>
+            <a:endParaRPr lang="en-US" dirty="0">
+              <a:solidFill>
+                <a:srgbClr val="FF0000"/>
+              </a:solidFill>
+            </a:endParaRPr>
+          </a:p>
+        </p:txBody>
+      </p:sp>
+      <p:sp>
+        <p:nvSpPr>
+          <p:cNvPr id="18" name="Oval 17"/>
+          <p:cNvSpPr/>
+          <p:nvPr/>
+        </p:nvSpPr>
+        <p:spPr>
+          <a:xfrm>
+            <a:off x="10325960" y="5971674"/>
+            <a:ext cx="320842" cy="328863"/>
+          </a:xfrm>
+          <a:prstGeom prst="ellipse">
+            <a:avLst/>
+          </a:prstGeom>
+          <a:noFill/>
+          <a:ln w="28575">
+            <a:solidFill>
+              <a:srgbClr val="FF0000"/>
+            </a:solidFill>
+          </a:ln>
+        </p:spPr>
+        <p:style>
+          <a:lnRef idx="2">
+            <a:schemeClr val="accent1">
+              <a:shade val="50000"/>
+            </a:schemeClr>
+          </a:lnRef>
+          <a:fillRef idx="1">
+            <a:schemeClr val="accent1"/>
+          </a:fillRef>
+          <a:effectRef idx="0">
+            <a:schemeClr val="accent1"/>
+          </a:effectRef>
+          <a:fontRef idx="minor">
+            <a:schemeClr val="lt1"/>
+          </a:fontRef>
+        </p:style>
+        <p:txBody>
+          <a:bodyPr rtlCol="0" anchor="ctr"/>
+          <a:lstStyle/>
+          <a:p>
+            <a:pPr algn="ctr"/>
+            <a:r>
+              <a:rPr lang="fi-FI" dirty="0">
+                <a:solidFill>
+                  <a:srgbClr val="FF0000"/>
+                </a:solidFill>
+              </a:rPr>
+              <a:t>2</a:t>
+            </a:r>
+            <a:endParaRPr lang="en-US" dirty="0">
+              <a:solidFill>
+                <a:srgbClr val="FF0000"/>
+              </a:solidFill>
+            </a:endParaRPr>
+          </a:p>
+        </p:txBody>
+      </p:sp>
+      <p:sp>
+        <p:nvSpPr>
+          <p:cNvPr id="19" name="Oval 18"/>
+          <p:cNvSpPr/>
+          <p:nvPr/>
+        </p:nvSpPr>
+        <p:spPr>
+          <a:xfrm>
+            <a:off x="10783160" y="5971673"/>
+            <a:ext cx="320842" cy="328863"/>
+          </a:xfrm>
+          <a:prstGeom prst="ellipse">
+            <a:avLst/>
+          </a:prstGeom>
+          <a:noFill/>
+          <a:ln w="28575">
+            <a:solidFill>
+              <a:srgbClr val="FF0000"/>
+            </a:solidFill>
+          </a:ln>
+        </p:spPr>
+        <p:style>
+          <a:lnRef idx="2">
+            <a:schemeClr val="accent1">
+              <a:shade val="50000"/>
+            </a:schemeClr>
+          </a:lnRef>
+          <a:fillRef idx="1">
+            <a:schemeClr val="accent1"/>
+          </a:fillRef>
+          <a:effectRef idx="0">
+            <a:schemeClr val="accent1"/>
+          </a:effectRef>
+          <a:fontRef idx="minor">
+            <a:schemeClr val="lt1"/>
+          </a:fontRef>
+        </p:style>
+        <p:txBody>
+          <a:bodyPr rtlCol="0" anchor="ctr"/>
+          <a:lstStyle/>
+          <a:p>
+            <a:pPr algn="ctr"/>
+            <a:r>
+              <a:rPr lang="fi-FI" dirty="0">
+                <a:solidFill>
+                  <a:srgbClr val="FF0000"/>
+                </a:solidFill>
+              </a:rPr>
+              <a:t>3</a:t>
             </a:r>
             <a:endParaRPr lang="en-US" dirty="0">
               <a:solidFill>

</xml_diff>